<commit_message>
Add nested route structure
</commit_message>
<xml_diff>
--- a/resources/pictures.pptx
+++ b/resources/pictures.pptx
@@ -3522,8 +3522,8 @@
         </p:nvSpPr>
         <p:spPr>
           <a:xfrm>
-            <a:off x="3383006" y="2321004"/>
-            <a:ext cx="5425987" cy="2215991"/>
+            <a:off x="3200399" y="2619999"/>
+            <a:ext cx="5791200" cy="2215991"/>
           </a:xfrm>
           <a:prstGeom prst="rect">
             <a:avLst/>
@@ -4007,7 +4007,7 @@
         </p:nvSpPr>
         <p:spPr>
           <a:xfrm>
-            <a:off x="761998" y="2780844"/>
+            <a:off x="761998" y="2850293"/>
             <a:ext cx="10668000" cy="769441"/>
           </a:xfrm>
           <a:prstGeom prst="rect">
@@ -4052,7 +4052,7 @@
         </p:nvSpPr>
         <p:spPr>
           <a:xfrm>
-            <a:off x="3912243" y="3939712"/>
+            <a:off x="3912243" y="4009161"/>
             <a:ext cx="5278056" cy="620713"/>
           </a:xfrm>
           <a:prstGeom prst="roundRect">
@@ -4106,7 +4106,7 @@
         </p:nvSpPr>
         <p:spPr>
           <a:xfrm>
-            <a:off x="1444903" y="3957680"/>
+            <a:off x="1444903" y="4027129"/>
             <a:ext cx="2326513" cy="584775"/>
           </a:xfrm>
           <a:prstGeom prst="rect">
@@ -4151,7 +4151,7 @@
         </p:nvSpPr>
         <p:spPr>
           <a:xfrm>
-            <a:off x="1444902" y="4911753"/>
+            <a:off x="1444902" y="4981202"/>
             <a:ext cx="2326513" cy="584775"/>
           </a:xfrm>
           <a:prstGeom prst="rect">
@@ -4196,7 +4196,7 @@
         </p:nvSpPr>
         <p:spPr>
           <a:xfrm>
-            <a:off x="3912243" y="4893784"/>
+            <a:off x="3912243" y="4963233"/>
             <a:ext cx="5278056" cy="620713"/>
           </a:xfrm>
           <a:prstGeom prst="roundRect">

</xml_diff>

<commit_message>
Implement signup logic (in progress)
</commit_message>
<xml_diff>
--- a/resources/pictures.pptx
+++ b/resources/pictures.pptx
@@ -261,7 +261,7 @@
           <a:p>
             <a:fld id="{2EF51DFC-C690-4AED-8C7D-5E6B29454EC5}" type="datetimeFigureOut">
               <a:rPr lang="ko-KR" altLang="en-US" smtClean="0"/>
-              <a:t>2020-06-10</a:t>
+              <a:t>2020-06-11</a:t>
             </a:fld>
             <a:endParaRPr lang="ko-KR" altLang="en-US"/>
           </a:p>
@@ -459,7 +459,7 @@
           <a:p>
             <a:fld id="{2EF51DFC-C690-4AED-8C7D-5E6B29454EC5}" type="datetimeFigureOut">
               <a:rPr lang="ko-KR" altLang="en-US" smtClean="0"/>
-              <a:t>2020-06-10</a:t>
+              <a:t>2020-06-11</a:t>
             </a:fld>
             <a:endParaRPr lang="ko-KR" altLang="en-US"/>
           </a:p>
@@ -667,7 +667,7 @@
           <a:p>
             <a:fld id="{2EF51DFC-C690-4AED-8C7D-5E6B29454EC5}" type="datetimeFigureOut">
               <a:rPr lang="ko-KR" altLang="en-US" smtClean="0"/>
-              <a:t>2020-06-10</a:t>
+              <a:t>2020-06-11</a:t>
             </a:fld>
             <a:endParaRPr lang="ko-KR" altLang="en-US"/>
           </a:p>
@@ -865,7 +865,7 @@
           <a:p>
             <a:fld id="{2EF51DFC-C690-4AED-8C7D-5E6B29454EC5}" type="datetimeFigureOut">
               <a:rPr lang="ko-KR" altLang="en-US" smtClean="0"/>
-              <a:t>2020-06-10</a:t>
+              <a:t>2020-06-11</a:t>
             </a:fld>
             <a:endParaRPr lang="ko-KR" altLang="en-US"/>
           </a:p>
@@ -1140,7 +1140,7 @@
           <a:p>
             <a:fld id="{2EF51DFC-C690-4AED-8C7D-5E6B29454EC5}" type="datetimeFigureOut">
               <a:rPr lang="ko-KR" altLang="en-US" smtClean="0"/>
-              <a:t>2020-06-10</a:t>
+              <a:t>2020-06-11</a:t>
             </a:fld>
             <a:endParaRPr lang="ko-KR" altLang="en-US"/>
           </a:p>
@@ -1405,7 +1405,7 @@
           <a:p>
             <a:fld id="{2EF51DFC-C690-4AED-8C7D-5E6B29454EC5}" type="datetimeFigureOut">
               <a:rPr lang="ko-KR" altLang="en-US" smtClean="0"/>
-              <a:t>2020-06-10</a:t>
+              <a:t>2020-06-11</a:t>
             </a:fld>
             <a:endParaRPr lang="ko-KR" altLang="en-US"/>
           </a:p>
@@ -1817,7 +1817,7 @@
           <a:p>
             <a:fld id="{2EF51DFC-C690-4AED-8C7D-5E6B29454EC5}" type="datetimeFigureOut">
               <a:rPr lang="ko-KR" altLang="en-US" smtClean="0"/>
-              <a:t>2020-06-10</a:t>
+              <a:t>2020-06-11</a:t>
             </a:fld>
             <a:endParaRPr lang="ko-KR" altLang="en-US"/>
           </a:p>
@@ -1958,7 +1958,7 @@
           <a:p>
             <a:fld id="{2EF51DFC-C690-4AED-8C7D-5E6B29454EC5}" type="datetimeFigureOut">
               <a:rPr lang="ko-KR" altLang="en-US" smtClean="0"/>
-              <a:t>2020-06-10</a:t>
+              <a:t>2020-06-11</a:t>
             </a:fld>
             <a:endParaRPr lang="ko-KR" altLang="en-US"/>
           </a:p>
@@ -2071,7 +2071,7 @@
           <a:p>
             <a:fld id="{2EF51DFC-C690-4AED-8C7D-5E6B29454EC5}" type="datetimeFigureOut">
               <a:rPr lang="ko-KR" altLang="en-US" smtClean="0"/>
-              <a:t>2020-06-10</a:t>
+              <a:t>2020-06-11</a:t>
             </a:fld>
             <a:endParaRPr lang="ko-KR" altLang="en-US"/>
           </a:p>
@@ -2382,7 +2382,7 @@
           <a:p>
             <a:fld id="{2EF51DFC-C690-4AED-8C7D-5E6B29454EC5}" type="datetimeFigureOut">
               <a:rPr lang="ko-KR" altLang="en-US" smtClean="0"/>
-              <a:t>2020-06-10</a:t>
+              <a:t>2020-06-11</a:t>
             </a:fld>
             <a:endParaRPr lang="ko-KR" altLang="en-US"/>
           </a:p>
@@ -2670,7 +2670,7 @@
           <a:p>
             <a:fld id="{2EF51DFC-C690-4AED-8C7D-5E6B29454EC5}" type="datetimeFigureOut">
               <a:rPr lang="ko-KR" altLang="en-US" smtClean="0"/>
-              <a:t>2020-06-10</a:t>
+              <a:t>2020-06-11</a:t>
             </a:fld>
             <a:endParaRPr lang="ko-KR" altLang="en-US"/>
           </a:p>
@@ -2911,7 +2911,7 @@
           <a:p>
             <a:fld id="{2EF51DFC-C690-4AED-8C7D-5E6B29454EC5}" type="datetimeFigureOut">
               <a:rPr lang="ko-KR" altLang="en-US" smtClean="0"/>
-              <a:t>2020-06-10</a:t>
+              <a:t>2020-06-11</a:t>
             </a:fld>
             <a:endParaRPr lang="ko-KR" altLang="en-US"/>
           </a:p>
@@ -3388,37 +3388,134 @@
           </a:p>
         </p:txBody>
       </p:sp>
-      <p:sp>
-        <p:nvSpPr>
-          <p:cNvPr id="4" name="TextBox 3">
-            <a:extLst>
-              <a:ext uri="{FF2B5EF4-FFF2-40B4-BE49-F238E27FC236}">
-                <a16:creationId xmlns:a16="http://schemas.microsoft.com/office/drawing/2014/main" id="{DBF384C6-D8FC-41F3-ADD9-BB744B972AA9}"/>
-              </a:ext>
-            </a:extLst>
-          </p:cNvPr>
-          <p:cNvSpPr txBox="1"/>
+      <p:grpSp>
+        <p:nvGrpSpPr>
+          <p:cNvPr id="3" name="그룹 2">
+            <a:extLst>
+              <a:ext uri="{FF2B5EF4-FFF2-40B4-BE49-F238E27FC236}">
+                <a16:creationId xmlns:a16="http://schemas.microsoft.com/office/drawing/2014/main" id="{3D288198-6517-4A30-9F8A-E084383E9DE9}"/>
+              </a:ext>
+            </a:extLst>
+          </p:cNvPr>
+          <p:cNvGrpSpPr/>
           <p:nvPr/>
-        </p:nvSpPr>
-        <p:spPr>
+        </p:nvGrpSpPr>
+        <p:grpSpPr>
           <a:xfrm>
-            <a:off x="761999" y="1850558"/>
-            <a:ext cx="10668000" cy="769441"/>
+            <a:off x="2121763" y="1850558"/>
+            <a:ext cx="7948472" cy="2985432"/>
+            <a:chOff x="2121763" y="1850558"/>
+            <a:chExt cx="7948472" cy="2985432"/>
           </a:xfrm>
-          <a:prstGeom prst="rect">
-            <a:avLst/>
-          </a:prstGeom>
-          <a:noFill/>
-        </p:spPr>
-        <p:txBody>
-          <a:bodyPr wrap="square" rtlCol="0">
-            <a:spAutoFit/>
-          </a:bodyPr>
-          <a:lstStyle/>
-          <a:p>
-            <a:pPr algn="ctr"/>
-            <a:r>
-              <a:rPr lang="ko-KR" altLang="en-US" sz="4400" dirty="0">
+        </p:grpSpPr>
+        <p:sp>
+          <p:nvSpPr>
+            <p:cNvPr id="4" name="TextBox 3">
+              <a:extLst>
+                <a:ext uri="{FF2B5EF4-FFF2-40B4-BE49-F238E27FC236}">
+                  <a16:creationId xmlns:a16="http://schemas.microsoft.com/office/drawing/2014/main" id="{DBF384C6-D8FC-41F3-ADD9-BB744B972AA9}"/>
+                </a:ext>
+              </a:extLst>
+            </p:cNvPr>
+            <p:cNvSpPr txBox="1"/>
+            <p:nvPr/>
+          </p:nvSpPr>
+          <p:spPr>
+            <a:xfrm>
+              <a:off x="2121763" y="1850558"/>
+              <a:ext cx="7948472" cy="769441"/>
+            </a:xfrm>
+            <a:prstGeom prst="rect">
+              <a:avLst/>
+            </a:prstGeom>
+            <a:noFill/>
+          </p:spPr>
+          <p:txBody>
+            <a:bodyPr wrap="square" rtlCol="0">
+              <a:spAutoFit/>
+            </a:bodyPr>
+            <a:lstStyle/>
+            <a:p>
+              <a:pPr algn="ctr"/>
+              <a:r>
+                <a:rPr lang="ko-KR" altLang="en-US" sz="4400" dirty="0">
+                  <a:solidFill>
+                    <a:schemeClr val="accent4">
+                      <a:lumMod val="75000"/>
+                    </a:schemeClr>
+                  </a:solidFill>
+                  <a:latin typeface="둥근모꼴" panose="020B0500000000000000" pitchFamily="50" charset="-127"/>
+                  <a:ea typeface="둥근모꼴" panose="020B0500000000000000" pitchFamily="50" charset="-127"/>
+                  <a:cs typeface="둥근모꼴" panose="020B0500000000000000" pitchFamily="50" charset="-127"/>
+                </a:rPr>
+                <a:t>뉴</a:t>
+              </a:r>
+              <a:r>
+                <a:rPr lang="en-US" altLang="ko-KR" sz="4400" dirty="0">
+                  <a:solidFill>
+                    <a:schemeClr val="accent4">
+                      <a:lumMod val="75000"/>
+                    </a:schemeClr>
+                  </a:solidFill>
+                  <a:latin typeface="둥근모꼴" panose="020B0500000000000000" pitchFamily="50" charset="-127"/>
+                  <a:ea typeface="둥근모꼴" panose="020B0500000000000000" pitchFamily="50" charset="-127"/>
+                  <a:cs typeface="둥근모꼴" panose="020B0500000000000000" pitchFamily="50" charset="-127"/>
+                </a:rPr>
+                <a:t>-</a:t>
+              </a:r>
+              <a:r>
+                <a:rPr lang="ko-KR" altLang="en-US" sz="4400" dirty="0" err="1">
+                  <a:solidFill>
+                    <a:schemeClr val="accent4">
+                      <a:lumMod val="75000"/>
+                    </a:schemeClr>
+                  </a:solidFill>
+                  <a:latin typeface="둥근모꼴" panose="020B0500000000000000" pitchFamily="50" charset="-127"/>
+                  <a:ea typeface="둥근모꼴" panose="020B0500000000000000" pitchFamily="50" charset="-127"/>
+                  <a:cs typeface="둥근모꼴" panose="020B0500000000000000" pitchFamily="50" charset="-127"/>
+                </a:rPr>
+                <a:t>트로</a:t>
+              </a:r>
+              <a:r>
+                <a:rPr lang="ko-KR" altLang="en-US" sz="4400" dirty="0">
+                  <a:solidFill>
+                    <a:schemeClr val="accent4">
+                      <a:lumMod val="75000"/>
+                    </a:schemeClr>
+                  </a:solidFill>
+                  <a:latin typeface="둥근모꼴" panose="020B0500000000000000" pitchFamily="50" charset="-127"/>
+                  <a:ea typeface="둥근모꼴" panose="020B0500000000000000" pitchFamily="50" charset="-127"/>
+                  <a:cs typeface="둥근모꼴" panose="020B0500000000000000" pitchFamily="50" charset="-127"/>
+                </a:rPr>
+                <a:t> 감성 메신저 써</a:t>
+              </a:r>
+              <a:r>
+                <a:rPr lang="en-US" altLang="ko-KR" sz="4400" dirty="0">
+                  <a:solidFill>
+                    <a:schemeClr val="accent4">
+                      <a:lumMod val="75000"/>
+                    </a:schemeClr>
+                  </a:solidFill>
+                  <a:latin typeface="둥근모꼴" panose="020B0500000000000000" pitchFamily="50" charset="-127"/>
+                  <a:ea typeface="둥근모꼴" panose="020B0500000000000000" pitchFamily="50" charset="-127"/>
+                  <a:cs typeface="둥근모꼴" panose="020B0500000000000000" pitchFamily="50" charset="-127"/>
+                </a:rPr>
+                <a:t>-</a:t>
+              </a:r>
+              <a:r>
+                <a:rPr lang="ko-KR" altLang="en-US" sz="4400" dirty="0" err="1">
+                  <a:solidFill>
+                    <a:schemeClr val="accent4">
+                      <a:lumMod val="75000"/>
+                    </a:schemeClr>
+                  </a:solidFill>
+                  <a:latin typeface="둥근모꼴" panose="020B0500000000000000" pitchFamily="50" charset="-127"/>
+                  <a:ea typeface="둥근모꼴" panose="020B0500000000000000" pitchFamily="50" charset="-127"/>
+                  <a:cs typeface="둥근모꼴" panose="020B0500000000000000" pitchFamily="50" charset="-127"/>
+                </a:rPr>
+                <a:t>비쓰</a:t>
+              </a:r>
+              <a:endParaRPr lang="ko-KR" altLang="en-US" sz="4400" dirty="0">
                 <a:solidFill>
                   <a:schemeClr val="accent4">
                     <a:lumMod val="75000"/>
@@ -3427,118 +3524,106 @@
                 <a:latin typeface="둥근모꼴" panose="020B0500000000000000" pitchFamily="50" charset="-127"/>
                 <a:ea typeface="둥근모꼴" panose="020B0500000000000000" pitchFamily="50" charset="-127"/>
                 <a:cs typeface="둥근모꼴" panose="020B0500000000000000" pitchFamily="50" charset="-127"/>
-              </a:rPr>
-              <a:t>뉴</a:t>
-            </a:r>
-            <a:r>
-              <a:rPr lang="en-US" altLang="ko-KR" sz="4400" dirty="0">
-                <a:solidFill>
-                  <a:schemeClr val="accent4">
-                    <a:lumMod val="75000"/>
-                  </a:schemeClr>
-                </a:solidFill>
-                <a:latin typeface="둥근모꼴" panose="020B0500000000000000" pitchFamily="50" charset="-127"/>
-                <a:ea typeface="둥근모꼴" panose="020B0500000000000000" pitchFamily="50" charset="-127"/>
-                <a:cs typeface="둥근모꼴" panose="020B0500000000000000" pitchFamily="50" charset="-127"/>
-              </a:rPr>
-              <a:t>-</a:t>
-            </a:r>
-            <a:r>
-              <a:rPr lang="ko-KR" altLang="en-US" sz="4400" dirty="0" err="1">
-                <a:solidFill>
-                  <a:schemeClr val="accent4">
-                    <a:lumMod val="75000"/>
-                  </a:schemeClr>
-                </a:solidFill>
-                <a:latin typeface="둥근모꼴" panose="020B0500000000000000" pitchFamily="50" charset="-127"/>
-                <a:ea typeface="둥근모꼴" panose="020B0500000000000000" pitchFamily="50" charset="-127"/>
-                <a:cs typeface="둥근모꼴" panose="020B0500000000000000" pitchFamily="50" charset="-127"/>
-              </a:rPr>
-              <a:t>트로</a:t>
-            </a:r>
-            <a:r>
-              <a:rPr lang="ko-KR" altLang="en-US" sz="4400" dirty="0">
-                <a:solidFill>
-                  <a:schemeClr val="accent4">
-                    <a:lumMod val="75000"/>
-                  </a:schemeClr>
-                </a:solidFill>
-                <a:latin typeface="둥근모꼴" panose="020B0500000000000000" pitchFamily="50" charset="-127"/>
-                <a:ea typeface="둥근모꼴" panose="020B0500000000000000" pitchFamily="50" charset="-127"/>
-                <a:cs typeface="둥근모꼴" panose="020B0500000000000000" pitchFamily="50" charset="-127"/>
-              </a:rPr>
-              <a:t> 감성 메신저 써</a:t>
-            </a:r>
-            <a:r>
-              <a:rPr lang="en-US" altLang="ko-KR" sz="4400" dirty="0">
-                <a:solidFill>
-                  <a:schemeClr val="accent4">
-                    <a:lumMod val="75000"/>
-                  </a:schemeClr>
-                </a:solidFill>
-                <a:latin typeface="둥근모꼴" panose="020B0500000000000000" pitchFamily="50" charset="-127"/>
-                <a:ea typeface="둥근모꼴" panose="020B0500000000000000" pitchFamily="50" charset="-127"/>
-                <a:cs typeface="둥근모꼴" panose="020B0500000000000000" pitchFamily="50" charset="-127"/>
-              </a:rPr>
-              <a:t>-</a:t>
-            </a:r>
-            <a:r>
-              <a:rPr lang="ko-KR" altLang="en-US" sz="4400" dirty="0" err="1">
-                <a:solidFill>
-                  <a:schemeClr val="accent4">
-                    <a:lumMod val="75000"/>
-                  </a:schemeClr>
-                </a:solidFill>
-                <a:latin typeface="둥근모꼴" panose="020B0500000000000000" pitchFamily="50" charset="-127"/>
-                <a:ea typeface="둥근모꼴" panose="020B0500000000000000" pitchFamily="50" charset="-127"/>
-                <a:cs typeface="둥근모꼴" panose="020B0500000000000000" pitchFamily="50" charset="-127"/>
-              </a:rPr>
-              <a:t>비쓰</a:t>
-            </a:r>
-            <a:endParaRPr lang="ko-KR" altLang="en-US" sz="4400" dirty="0">
-              <a:solidFill>
-                <a:schemeClr val="accent4">
-                  <a:lumMod val="75000"/>
-                </a:schemeClr>
-              </a:solidFill>
-              <a:latin typeface="둥근모꼴" panose="020B0500000000000000" pitchFamily="50" charset="-127"/>
-              <a:ea typeface="둥근모꼴" panose="020B0500000000000000" pitchFamily="50" charset="-127"/>
-              <a:cs typeface="둥근모꼴" panose="020B0500000000000000" pitchFamily="50" charset="-127"/>
-            </a:endParaRPr>
-          </a:p>
-        </p:txBody>
-      </p:sp>
-      <p:sp>
-        <p:nvSpPr>
-          <p:cNvPr id="5" name="직사각형 4">
-            <a:extLst>
-              <a:ext uri="{FF2B5EF4-FFF2-40B4-BE49-F238E27FC236}">
-                <a16:creationId xmlns:a16="http://schemas.microsoft.com/office/drawing/2014/main" id="{1E279B02-D517-43CD-A2E7-0C71E7D20EF8}"/>
-              </a:ext>
-            </a:extLst>
-          </p:cNvPr>
-          <p:cNvSpPr/>
-          <p:nvPr/>
-        </p:nvSpPr>
-        <p:spPr>
-          <a:xfrm>
-            <a:off x="3200399" y="2619999"/>
-            <a:ext cx="5791200" cy="2215991"/>
-          </a:xfrm>
-          <a:prstGeom prst="rect">
-            <a:avLst/>
-          </a:prstGeom>
-          <a:noFill/>
-        </p:spPr>
-        <p:txBody>
-          <a:bodyPr wrap="square" lIns="91440" tIns="45720" rIns="91440" bIns="45720">
-            <a:spAutoFit/>
-          </a:bodyPr>
-          <a:lstStyle/>
-          <a:p>
-            <a:pPr algn="ctr"/>
-            <a:r>
-              <a:rPr lang="ko-KR" altLang="en-US" sz="13800" b="1" dirty="0">
+              </a:endParaRPr>
+            </a:p>
+          </p:txBody>
+        </p:sp>
+        <p:sp>
+          <p:nvSpPr>
+            <p:cNvPr id="5" name="직사각형 4">
+              <a:extLst>
+                <a:ext uri="{FF2B5EF4-FFF2-40B4-BE49-F238E27FC236}">
+                  <a16:creationId xmlns:a16="http://schemas.microsoft.com/office/drawing/2014/main" id="{1E279B02-D517-43CD-A2E7-0C71E7D20EF8}"/>
+                </a:ext>
+              </a:extLst>
+            </p:cNvPr>
+            <p:cNvSpPr/>
+            <p:nvPr/>
+          </p:nvSpPr>
+          <p:spPr>
+            <a:xfrm>
+              <a:off x="3200399" y="2619999"/>
+              <a:ext cx="5791200" cy="2215991"/>
+            </a:xfrm>
+            <a:prstGeom prst="rect">
+              <a:avLst/>
+            </a:prstGeom>
+            <a:noFill/>
+          </p:spPr>
+          <p:txBody>
+            <a:bodyPr wrap="square" lIns="91440" tIns="45720" rIns="91440" bIns="45720">
+              <a:spAutoFit/>
+            </a:bodyPr>
+            <a:lstStyle/>
+            <a:p>
+              <a:pPr algn="ctr"/>
+              <a:r>
+                <a:rPr lang="ko-KR" altLang="en-US" sz="13800" b="1" dirty="0">
+                  <a:ln w="6600">
+                    <a:solidFill>
+                      <a:schemeClr val="accent2"/>
+                    </a:solidFill>
+                    <a:prstDash val="solid"/>
+                  </a:ln>
+                  <a:solidFill>
+                    <a:srgbClr val="FFFFFF"/>
+                  </a:solidFill>
+                  <a:effectLst>
+                    <a:outerShdw dist="38100" dir="2700000" algn="tl" rotWithShape="0">
+                      <a:schemeClr val="accent2"/>
+                    </a:outerShdw>
+                  </a:effectLst>
+                  <a:latin typeface="둥근모꼴" panose="020B0500000000000000" pitchFamily="50" charset="-127"/>
+                  <a:ea typeface="둥근모꼴" panose="020B0500000000000000" pitchFamily="50" charset="-127"/>
+                  <a:cs typeface="둥근모꼴" panose="020B0500000000000000" pitchFamily="50" charset="-127"/>
+                </a:rPr>
+                <a:t>삐</a:t>
+              </a:r>
+              <a:r>
+                <a:rPr lang="en-US" altLang="ko-KR" sz="13800" b="1" dirty="0">
+                  <a:ln w="6600">
+                    <a:solidFill>
+                      <a:schemeClr val="accent2"/>
+                    </a:solidFill>
+                    <a:prstDash val="solid"/>
+                  </a:ln>
+                  <a:solidFill>
+                    <a:srgbClr val="FFFFFF"/>
+                  </a:solidFill>
+                  <a:effectLst>
+                    <a:outerShdw dist="38100" dir="2700000" algn="tl" rotWithShape="0">
+                      <a:schemeClr val="accent2"/>
+                    </a:outerShdw>
+                  </a:effectLst>
+                  <a:latin typeface="둥근모꼴" panose="020B0500000000000000" pitchFamily="50" charset="-127"/>
+                  <a:ea typeface="둥근모꼴" panose="020B0500000000000000" pitchFamily="50" charset="-127"/>
+                  <a:cs typeface="둥근모꼴" panose="020B0500000000000000" pitchFamily="50" charset="-127"/>
+                </a:rPr>
+                <a:t>-</a:t>
+              </a:r>
+              <a:r>
+                <a:rPr lang="ko-KR" altLang="en-US" sz="13800" b="1" dirty="0">
+                  <a:ln w="6600">
+                    <a:solidFill>
+                      <a:schemeClr val="accent2"/>
+                    </a:solidFill>
+                    <a:prstDash val="solid"/>
+                  </a:ln>
+                  <a:solidFill>
+                    <a:srgbClr val="FFFFFF"/>
+                  </a:solidFill>
+                  <a:effectLst>
+                    <a:outerShdw dist="38100" dir="2700000" algn="tl" rotWithShape="0">
+                      <a:schemeClr val="accent2"/>
+                    </a:outerShdw>
+                  </a:effectLst>
+                  <a:latin typeface="둥근모꼴" panose="020B0500000000000000" pitchFamily="50" charset="-127"/>
+                  <a:ea typeface="둥근모꼴" panose="020B0500000000000000" pitchFamily="50" charset="-127"/>
+                  <a:cs typeface="둥근모꼴" panose="020B0500000000000000" pitchFamily="50" charset="-127"/>
+                </a:rPr>
+                <a:t>삐</a:t>
+              </a:r>
+              <a:endParaRPr lang="ko-KR" altLang="en-US" sz="13800" b="1" dirty="0">
                 <a:ln w="6600">
                   <a:solidFill>
                     <a:schemeClr val="accent2"/>
@@ -3553,75 +3638,11 @@
                     <a:schemeClr val="accent2"/>
                   </a:outerShdw>
                 </a:effectLst>
-                <a:latin typeface="둥근모꼴" panose="020B0500000000000000" pitchFamily="50" charset="-127"/>
-                <a:ea typeface="둥근모꼴" panose="020B0500000000000000" pitchFamily="50" charset="-127"/>
-                <a:cs typeface="둥근모꼴" panose="020B0500000000000000" pitchFamily="50" charset="-127"/>
-              </a:rPr>
-              <a:t>삐</a:t>
-            </a:r>
-            <a:r>
-              <a:rPr lang="en-US" altLang="ko-KR" sz="13800" b="1" dirty="0">
-                <a:ln w="6600">
-                  <a:solidFill>
-                    <a:schemeClr val="accent2"/>
-                  </a:solidFill>
-                  <a:prstDash val="solid"/>
-                </a:ln>
-                <a:solidFill>
-                  <a:srgbClr val="FFFFFF"/>
-                </a:solidFill>
-                <a:effectLst>
-                  <a:outerShdw dist="38100" dir="2700000" algn="tl" rotWithShape="0">
-                    <a:schemeClr val="accent2"/>
-                  </a:outerShdw>
-                </a:effectLst>
-                <a:latin typeface="둥근모꼴" panose="020B0500000000000000" pitchFamily="50" charset="-127"/>
-                <a:ea typeface="둥근모꼴" panose="020B0500000000000000" pitchFamily="50" charset="-127"/>
-                <a:cs typeface="둥근모꼴" panose="020B0500000000000000" pitchFamily="50" charset="-127"/>
-              </a:rPr>
-              <a:t>-</a:t>
-            </a:r>
-            <a:r>
-              <a:rPr lang="ko-KR" altLang="en-US" sz="13800" b="1" dirty="0">
-                <a:ln w="6600">
-                  <a:solidFill>
-                    <a:schemeClr val="accent2"/>
-                  </a:solidFill>
-                  <a:prstDash val="solid"/>
-                </a:ln>
-                <a:solidFill>
-                  <a:srgbClr val="FFFFFF"/>
-                </a:solidFill>
-                <a:effectLst>
-                  <a:outerShdw dist="38100" dir="2700000" algn="tl" rotWithShape="0">
-                    <a:schemeClr val="accent2"/>
-                  </a:outerShdw>
-                </a:effectLst>
-                <a:latin typeface="둥근모꼴" panose="020B0500000000000000" pitchFamily="50" charset="-127"/>
-                <a:ea typeface="둥근모꼴" panose="020B0500000000000000" pitchFamily="50" charset="-127"/>
-                <a:cs typeface="둥근모꼴" panose="020B0500000000000000" pitchFamily="50" charset="-127"/>
-              </a:rPr>
-              <a:t>삐</a:t>
-            </a:r>
-            <a:endParaRPr lang="ko-KR" altLang="en-US" sz="13800" b="1" dirty="0">
-              <a:ln w="6600">
-                <a:solidFill>
-                  <a:schemeClr val="accent2"/>
-                </a:solidFill>
-                <a:prstDash val="solid"/>
-              </a:ln>
-              <a:solidFill>
-                <a:srgbClr val="FFFFFF"/>
-              </a:solidFill>
-              <a:effectLst>
-                <a:outerShdw dist="38100" dir="2700000" algn="tl" rotWithShape="0">
-                  <a:schemeClr val="accent2"/>
-                </a:outerShdw>
-              </a:effectLst>
-            </a:endParaRPr>
-          </a:p>
-        </p:txBody>
-      </p:sp>
+              </a:endParaRPr>
+            </a:p>
+          </p:txBody>
+        </p:sp>
+      </p:grpSp>
     </p:spTree>
     <p:extLst>
       <p:ext uri="{BB962C8B-B14F-4D97-AF65-F5344CB8AC3E}">

</xml_diff>

<commit_message>
Implement main page structure
</commit_message>
<xml_diff>
--- a/resources/pictures.pptx
+++ b/resources/pictures.pptx
@@ -8,6 +8,7 @@
     <p:sldId id="256" r:id="rId2"/>
     <p:sldId id="258" r:id="rId3"/>
     <p:sldId id="257" r:id="rId4"/>
+    <p:sldId id="259" r:id="rId5"/>
   </p:sldIdLst>
   <p:sldSz cx="12192000" cy="6858000"/>
   <p:notesSz cx="6858000" cy="9144000"/>
@@ -261,7 +262,7 @@
           <a:p>
             <a:fld id="{2EF51DFC-C690-4AED-8C7D-5E6B29454EC5}" type="datetimeFigureOut">
               <a:rPr lang="ko-KR" altLang="en-US" smtClean="0"/>
-              <a:t>2020-06-11</a:t>
+              <a:t>2020-06-12</a:t>
             </a:fld>
             <a:endParaRPr lang="ko-KR" altLang="en-US"/>
           </a:p>
@@ -459,7 +460,7 @@
           <a:p>
             <a:fld id="{2EF51DFC-C690-4AED-8C7D-5E6B29454EC5}" type="datetimeFigureOut">
               <a:rPr lang="ko-KR" altLang="en-US" smtClean="0"/>
-              <a:t>2020-06-11</a:t>
+              <a:t>2020-06-12</a:t>
             </a:fld>
             <a:endParaRPr lang="ko-KR" altLang="en-US"/>
           </a:p>
@@ -667,7 +668,7 @@
           <a:p>
             <a:fld id="{2EF51DFC-C690-4AED-8C7D-5E6B29454EC5}" type="datetimeFigureOut">
               <a:rPr lang="ko-KR" altLang="en-US" smtClean="0"/>
-              <a:t>2020-06-11</a:t>
+              <a:t>2020-06-12</a:t>
             </a:fld>
             <a:endParaRPr lang="ko-KR" altLang="en-US"/>
           </a:p>
@@ -865,7 +866,7 @@
           <a:p>
             <a:fld id="{2EF51DFC-C690-4AED-8C7D-5E6B29454EC5}" type="datetimeFigureOut">
               <a:rPr lang="ko-KR" altLang="en-US" smtClean="0"/>
-              <a:t>2020-06-11</a:t>
+              <a:t>2020-06-12</a:t>
             </a:fld>
             <a:endParaRPr lang="ko-KR" altLang="en-US"/>
           </a:p>
@@ -1140,7 +1141,7 @@
           <a:p>
             <a:fld id="{2EF51DFC-C690-4AED-8C7D-5E6B29454EC5}" type="datetimeFigureOut">
               <a:rPr lang="ko-KR" altLang="en-US" smtClean="0"/>
-              <a:t>2020-06-11</a:t>
+              <a:t>2020-06-12</a:t>
             </a:fld>
             <a:endParaRPr lang="ko-KR" altLang="en-US"/>
           </a:p>
@@ -1405,7 +1406,7 @@
           <a:p>
             <a:fld id="{2EF51DFC-C690-4AED-8C7D-5E6B29454EC5}" type="datetimeFigureOut">
               <a:rPr lang="ko-KR" altLang="en-US" smtClean="0"/>
-              <a:t>2020-06-11</a:t>
+              <a:t>2020-06-12</a:t>
             </a:fld>
             <a:endParaRPr lang="ko-KR" altLang="en-US"/>
           </a:p>
@@ -1817,7 +1818,7 @@
           <a:p>
             <a:fld id="{2EF51DFC-C690-4AED-8C7D-5E6B29454EC5}" type="datetimeFigureOut">
               <a:rPr lang="ko-KR" altLang="en-US" smtClean="0"/>
-              <a:t>2020-06-11</a:t>
+              <a:t>2020-06-12</a:t>
             </a:fld>
             <a:endParaRPr lang="ko-KR" altLang="en-US"/>
           </a:p>
@@ -1958,7 +1959,7 @@
           <a:p>
             <a:fld id="{2EF51DFC-C690-4AED-8C7D-5E6B29454EC5}" type="datetimeFigureOut">
               <a:rPr lang="ko-KR" altLang="en-US" smtClean="0"/>
-              <a:t>2020-06-11</a:t>
+              <a:t>2020-06-12</a:t>
             </a:fld>
             <a:endParaRPr lang="ko-KR" altLang="en-US"/>
           </a:p>
@@ -2071,7 +2072,7 @@
           <a:p>
             <a:fld id="{2EF51DFC-C690-4AED-8C7D-5E6B29454EC5}" type="datetimeFigureOut">
               <a:rPr lang="ko-KR" altLang="en-US" smtClean="0"/>
-              <a:t>2020-06-11</a:t>
+              <a:t>2020-06-12</a:t>
             </a:fld>
             <a:endParaRPr lang="ko-KR" altLang="en-US"/>
           </a:p>
@@ -2382,7 +2383,7 @@
           <a:p>
             <a:fld id="{2EF51DFC-C690-4AED-8C7D-5E6B29454EC5}" type="datetimeFigureOut">
               <a:rPr lang="ko-KR" altLang="en-US" smtClean="0"/>
-              <a:t>2020-06-11</a:t>
+              <a:t>2020-06-12</a:t>
             </a:fld>
             <a:endParaRPr lang="ko-KR" altLang="en-US"/>
           </a:p>
@@ -2670,7 +2671,7 @@
           <a:p>
             <a:fld id="{2EF51DFC-C690-4AED-8C7D-5E6B29454EC5}" type="datetimeFigureOut">
               <a:rPr lang="ko-KR" altLang="en-US" smtClean="0"/>
-              <a:t>2020-06-11</a:t>
+              <a:t>2020-06-12</a:t>
             </a:fld>
             <a:endParaRPr lang="ko-KR" altLang="en-US"/>
           </a:p>
@@ -2911,7 +2912,7 @@
           <a:p>
             <a:fld id="{2EF51DFC-C690-4AED-8C7D-5E6B29454EC5}" type="datetimeFigureOut">
               <a:rPr lang="ko-KR" altLang="en-US" smtClean="0"/>
-              <a:t>2020-06-11</a:t>
+              <a:t>2020-06-12</a:t>
             </a:fld>
             <a:endParaRPr lang="ko-KR" altLang="en-US"/>
           </a:p>
@@ -4798,6 +4799,586 @@
 </p:sld>
 </file>
 
+<file path=ppt/slides/slide4.xml><?xml version="1.0" encoding="utf-8"?>
+<p:sld xmlns:a="http://schemas.openxmlformats.org/drawingml/2006/main" xmlns:r="http://schemas.openxmlformats.org/officeDocument/2006/relationships" xmlns:p="http://schemas.openxmlformats.org/presentationml/2006/main">
+  <p:cSld>
+    <p:spTree>
+      <p:nvGrpSpPr>
+        <p:cNvPr id="1" name=""/>
+        <p:cNvGrpSpPr/>
+        <p:nvPr/>
+      </p:nvGrpSpPr>
+      <p:grpSpPr>
+        <a:xfrm>
+          <a:off x="0" y="0"/>
+          <a:ext cx="0" cy="0"/>
+          <a:chOff x="0" y="0"/>
+          <a:chExt cx="0" cy="0"/>
+        </a:xfrm>
+      </p:grpSpPr>
+      <p:pic>
+        <p:nvPicPr>
+          <p:cNvPr id="1026" name="Picture 2" descr="Bead Sprite - Tamagotchi Full Set by ~satoshi-miyako on deviantART ...">
+            <a:extLst>
+              <a:ext uri="{FF2B5EF4-FFF2-40B4-BE49-F238E27FC236}">
+                <a16:creationId xmlns:a16="http://schemas.microsoft.com/office/drawing/2014/main" id="{F47749DD-2AC1-4E9C-A96A-20653DA75C00}"/>
+              </a:ext>
+            </a:extLst>
+          </p:cNvPr>
+          <p:cNvPicPr>
+            <a:picLocks noChangeAspect="1" noChangeArrowheads="1"/>
+          </p:cNvPicPr>
+          <p:nvPr/>
+        </p:nvPicPr>
+        <p:blipFill>
+          <a:blip r:embed="rId2">
+            <a:extLst>
+              <a:ext uri="{28A0092B-C50C-407E-A947-70E740481C1C}">
+                <a14:useLocalDpi xmlns:a14="http://schemas.microsoft.com/office/drawing/2010/main" val="0"/>
+              </a:ext>
+            </a:extLst>
+          </a:blip>
+          <a:srcRect/>
+          <a:stretch>
+            <a:fillRect/>
+          </a:stretch>
+        </p:blipFill>
+        <p:spPr bwMode="auto">
+          <a:xfrm>
+            <a:off x="557136" y="133166"/>
+            <a:ext cx="2500313" cy="6858000"/>
+          </a:xfrm>
+          <a:prstGeom prst="rect">
+            <a:avLst/>
+          </a:prstGeom>
+          <a:noFill/>
+          <a:extLst>
+            <a:ext uri="{909E8E84-426E-40DD-AFC4-6F175D3DCCD1}">
+              <a14:hiddenFill xmlns:a14="http://schemas.microsoft.com/office/drawing/2010/main">
+                <a:solidFill>
+                  <a:srgbClr val="FFFFFF"/>
+                </a:solidFill>
+              </a14:hiddenFill>
+            </a:ext>
+          </a:extLst>
+        </p:spPr>
+      </p:pic>
+      <p:grpSp>
+        <p:nvGrpSpPr>
+          <p:cNvPr id="6" name="그룹 5">
+            <a:extLst>
+              <a:ext uri="{FF2B5EF4-FFF2-40B4-BE49-F238E27FC236}">
+                <a16:creationId xmlns:a16="http://schemas.microsoft.com/office/drawing/2014/main" id="{054D5D31-2D2B-4E69-B47F-6768D346DB28}"/>
+              </a:ext>
+            </a:extLst>
+          </p:cNvPr>
+          <p:cNvGrpSpPr/>
+          <p:nvPr/>
+        </p:nvGrpSpPr>
+        <p:grpSpPr>
+          <a:xfrm>
+            <a:off x="4607511" y="600007"/>
+            <a:ext cx="683581" cy="683581"/>
+            <a:chOff x="6986726" y="679906"/>
+            <a:chExt cx="683581" cy="683581"/>
+          </a:xfrm>
+        </p:grpSpPr>
+        <p:sp>
+          <p:nvSpPr>
+            <p:cNvPr id="4" name="타원 3">
+              <a:extLst>
+                <a:ext uri="{FF2B5EF4-FFF2-40B4-BE49-F238E27FC236}">
+                  <a16:creationId xmlns:a16="http://schemas.microsoft.com/office/drawing/2014/main" id="{889C2F3D-E68B-42AD-831F-1B7E5B9FB078}"/>
+                </a:ext>
+              </a:extLst>
+            </p:cNvPr>
+            <p:cNvSpPr/>
+            <p:nvPr/>
+          </p:nvSpPr>
+          <p:spPr>
+            <a:xfrm>
+              <a:off x="6986726" y="679906"/>
+              <a:ext cx="683581" cy="683581"/>
+            </a:xfrm>
+            <a:prstGeom prst="ellipse">
+              <a:avLst/>
+            </a:prstGeom>
+            <a:solidFill>
+              <a:schemeClr val="bg1"/>
+            </a:solidFill>
+            <a:ln w="38100">
+              <a:solidFill>
+                <a:srgbClr val="FFC000"/>
+              </a:solidFill>
+            </a:ln>
+          </p:spPr>
+          <p:style>
+            <a:lnRef idx="2">
+              <a:schemeClr val="accent1">
+                <a:shade val="50000"/>
+              </a:schemeClr>
+            </a:lnRef>
+            <a:fillRef idx="1">
+              <a:schemeClr val="accent1"/>
+            </a:fillRef>
+            <a:effectRef idx="0">
+              <a:schemeClr val="accent1"/>
+            </a:effectRef>
+            <a:fontRef idx="minor">
+              <a:schemeClr val="lt1"/>
+            </a:fontRef>
+          </p:style>
+          <p:txBody>
+            <a:bodyPr rtlCol="0" anchor="ctr"/>
+            <a:lstStyle/>
+            <a:p>
+              <a:pPr algn="ctr"/>
+              <a:endParaRPr lang="ko-KR" altLang="en-US"/>
+            </a:p>
+          </p:txBody>
+        </p:sp>
+        <p:pic>
+          <p:nvPicPr>
+            <p:cNvPr id="5" name="Picture 2" descr="Bead Sprite - Tamagotchi Full Set by ~satoshi-miyako on deviantART ...">
+              <a:extLst>
+                <a:ext uri="{FF2B5EF4-FFF2-40B4-BE49-F238E27FC236}">
+                  <a16:creationId xmlns:a16="http://schemas.microsoft.com/office/drawing/2014/main" id="{40C76DF8-20D9-4D11-8AD5-B84DA8EE2D64}"/>
+                </a:ext>
+              </a:extLst>
+            </p:cNvPr>
+            <p:cNvPicPr>
+              <a:picLocks noChangeAspect="1" noChangeArrowheads="1"/>
+            </p:cNvPicPr>
+            <p:nvPr/>
+          </p:nvPicPr>
+          <p:blipFill rotWithShape="1">
+            <a:blip r:embed="rId3">
+              <a:extLst>
+                <a:ext uri="{BEBA8EAE-BF5A-486C-A8C5-ECC9F3942E4B}">
+                  <a14:imgProps xmlns:a14="http://schemas.microsoft.com/office/drawing/2010/main">
+                    <a14:imgLayer r:embed="rId4">
+                      <a14:imgEffect>
+                        <a14:backgroundRemoval t="28224" b="35652" l="40556" r="57593">
+                          <a14:foregroundMark x1="45185" y1="31398" x2="45556" y2="32140"/>
+                          <a14:foregroundMark x1="52778" y1="31330" x2="52593" y2="32005"/>
+                          <a14:foregroundMark x1="46852" y1="33086" x2="47593" y2="33018"/>
+                          <a14:foregroundMark x1="42778" y1="33153" x2="43519" y2="33491"/>
+                          <a14:foregroundMark x1="41667" y1="32140" x2="41667" y2="31330"/>
+                          <a14:foregroundMark x1="46852" y1="29980" x2="51296" y2="29980"/>
+                          <a14:foregroundMark x1="54074" y1="30385" x2="54444" y2="30452"/>
+                          <a14:foregroundMark x1="55926" y1="30858" x2="56296" y2="30925"/>
+                          <a14:foregroundMark x1="57222" y1="31398" x2="57222" y2="32613"/>
+                          <a14:backgroundMark x1="50000" y1="30858" x2="49444" y2="32005"/>
+                          <a14:backgroundMark x1="43889" y1="31330" x2="43889" y2="32411"/>
+                          <a14:backgroundMark x1="48148" y1="34031" x2="50370" y2="34301"/>
+                          <a14:backgroundMark x1="54259" y1="32681" x2="55556" y2="31870"/>
+                        </a14:backgroundRemoval>
+                      </a14:imgEffect>
+                    </a14:imgLayer>
+                  </a14:imgProps>
+                </a:ext>
+                <a:ext uri="{28A0092B-C50C-407E-A947-70E740481C1C}">
+                  <a14:useLocalDpi xmlns:a14="http://schemas.microsoft.com/office/drawing/2010/main" val="0"/>
+                </a:ext>
+              </a:extLst>
+            </a:blip>
+            <a:srcRect l="40859" t="28565" r="42098" b="64249"/>
+            <a:stretch/>
+          </p:blipFill>
+          <p:spPr bwMode="auto">
+            <a:xfrm>
+              <a:off x="7115451" y="784523"/>
+              <a:ext cx="426129" cy="492760"/>
+            </a:xfrm>
+            <a:prstGeom prst="rect">
+              <a:avLst/>
+            </a:prstGeom>
+            <a:noFill/>
+            <a:extLst>
+              <a:ext uri="{909E8E84-426E-40DD-AFC4-6F175D3DCCD1}">
+                <a14:hiddenFill xmlns:a14="http://schemas.microsoft.com/office/drawing/2010/main">
+                  <a:solidFill>
+                    <a:srgbClr val="FFFFFF"/>
+                  </a:solidFill>
+                </a14:hiddenFill>
+              </a:ext>
+            </a:extLst>
+          </p:spPr>
+        </p:pic>
+      </p:grpSp>
+      <p:grpSp>
+        <p:nvGrpSpPr>
+          <p:cNvPr id="15" name="그룹 14">
+            <a:extLst>
+              <a:ext uri="{FF2B5EF4-FFF2-40B4-BE49-F238E27FC236}">
+                <a16:creationId xmlns:a16="http://schemas.microsoft.com/office/drawing/2014/main" id="{0A3148D6-6573-4510-A8EF-268906D512A5}"/>
+              </a:ext>
+            </a:extLst>
+          </p:cNvPr>
+          <p:cNvGrpSpPr/>
+          <p:nvPr/>
+        </p:nvGrpSpPr>
+        <p:grpSpPr>
+          <a:xfrm>
+            <a:off x="5664176" y="609213"/>
+            <a:ext cx="683581" cy="683581"/>
+            <a:chOff x="5664176" y="609213"/>
+            <a:chExt cx="683581" cy="683581"/>
+          </a:xfrm>
+        </p:grpSpPr>
+        <p:sp>
+          <p:nvSpPr>
+            <p:cNvPr id="9" name="타원 8">
+              <a:extLst>
+                <a:ext uri="{FF2B5EF4-FFF2-40B4-BE49-F238E27FC236}">
+                  <a16:creationId xmlns:a16="http://schemas.microsoft.com/office/drawing/2014/main" id="{AEB72D7D-9897-4B7C-84CB-2B612BBE1770}"/>
+                </a:ext>
+              </a:extLst>
+            </p:cNvPr>
+            <p:cNvSpPr/>
+            <p:nvPr/>
+          </p:nvSpPr>
+          <p:spPr>
+            <a:xfrm>
+              <a:off x="5664176" y="609213"/>
+              <a:ext cx="683581" cy="683581"/>
+            </a:xfrm>
+            <a:prstGeom prst="ellipse">
+              <a:avLst/>
+            </a:prstGeom>
+            <a:solidFill>
+              <a:schemeClr val="bg1"/>
+            </a:solidFill>
+            <a:ln w="38100">
+              <a:solidFill>
+                <a:srgbClr val="FFC000"/>
+              </a:solidFill>
+            </a:ln>
+          </p:spPr>
+          <p:style>
+            <a:lnRef idx="2">
+              <a:schemeClr val="accent1">
+                <a:shade val="50000"/>
+              </a:schemeClr>
+            </a:lnRef>
+            <a:fillRef idx="1">
+              <a:schemeClr val="accent1"/>
+            </a:fillRef>
+            <a:effectRef idx="0">
+              <a:schemeClr val="accent1"/>
+            </a:effectRef>
+            <a:fontRef idx="minor">
+              <a:schemeClr val="lt1"/>
+            </a:fontRef>
+          </p:style>
+          <p:txBody>
+            <a:bodyPr rtlCol="0" anchor="ctr"/>
+            <a:lstStyle/>
+            <a:p>
+              <a:pPr algn="ctr"/>
+              <a:endParaRPr lang="ko-KR" altLang="en-US"/>
+            </a:p>
+          </p:txBody>
+        </p:sp>
+        <p:pic>
+          <p:nvPicPr>
+            <p:cNvPr id="10" name="Picture 2" descr="Bead Sprite - Tamagotchi Full Set by ~satoshi-miyako on deviantART ...">
+              <a:extLst>
+                <a:ext uri="{FF2B5EF4-FFF2-40B4-BE49-F238E27FC236}">
+                  <a16:creationId xmlns:a16="http://schemas.microsoft.com/office/drawing/2014/main" id="{F4DAEF06-64B8-4922-BC84-FCE1CEAEECFF}"/>
+                </a:ext>
+              </a:extLst>
+            </p:cNvPr>
+            <p:cNvPicPr>
+              <a:picLocks noChangeAspect="1" noChangeArrowheads="1"/>
+            </p:cNvPicPr>
+            <p:nvPr/>
+          </p:nvPicPr>
+          <p:blipFill rotWithShape="1">
+            <a:blip r:embed="rId2">
+              <a:extLst>
+                <a:ext uri="{28A0092B-C50C-407E-A947-70E740481C1C}">
+                  <a14:useLocalDpi xmlns:a14="http://schemas.microsoft.com/office/drawing/2010/main" val="0"/>
+                </a:ext>
+              </a:extLst>
+            </a:blip>
+            <a:srcRect l="60306" t="36740" r="22018" b="57370"/>
+            <a:stretch/>
+          </p:blipFill>
+          <p:spPr bwMode="auto">
+            <a:xfrm>
+              <a:off x="5784985" y="775236"/>
+              <a:ext cx="441961" cy="403860"/>
+            </a:xfrm>
+            <a:prstGeom prst="rect">
+              <a:avLst/>
+            </a:prstGeom>
+            <a:noFill/>
+            <a:extLst>
+              <a:ext uri="{909E8E84-426E-40DD-AFC4-6F175D3DCCD1}">
+                <a14:hiddenFill xmlns:a14="http://schemas.microsoft.com/office/drawing/2010/main">
+                  <a:solidFill>
+                    <a:srgbClr val="FFFFFF"/>
+                  </a:solidFill>
+                </a14:hiddenFill>
+              </a:ext>
+            </a:extLst>
+          </p:spPr>
+        </p:pic>
+      </p:grpSp>
+      <p:grpSp>
+        <p:nvGrpSpPr>
+          <p:cNvPr id="16" name="그룹 15">
+            <a:extLst>
+              <a:ext uri="{FF2B5EF4-FFF2-40B4-BE49-F238E27FC236}">
+                <a16:creationId xmlns:a16="http://schemas.microsoft.com/office/drawing/2014/main" id="{4D6F2988-D80A-49C7-BA1F-2908E502DF3C}"/>
+              </a:ext>
+            </a:extLst>
+          </p:cNvPr>
+          <p:cNvGrpSpPr/>
+          <p:nvPr/>
+        </p:nvGrpSpPr>
+        <p:grpSpPr>
+          <a:xfrm>
+            <a:off x="4644737" y="1608957"/>
+            <a:ext cx="683581" cy="683581"/>
+            <a:chOff x="4644737" y="1608957"/>
+            <a:chExt cx="683581" cy="683581"/>
+          </a:xfrm>
+        </p:grpSpPr>
+        <p:sp>
+          <p:nvSpPr>
+            <p:cNvPr id="12" name="타원 11">
+              <a:extLst>
+                <a:ext uri="{FF2B5EF4-FFF2-40B4-BE49-F238E27FC236}">
+                  <a16:creationId xmlns:a16="http://schemas.microsoft.com/office/drawing/2014/main" id="{3A7C6586-CEC1-407F-96F5-1057649ED8CB}"/>
+                </a:ext>
+              </a:extLst>
+            </p:cNvPr>
+            <p:cNvSpPr/>
+            <p:nvPr/>
+          </p:nvSpPr>
+          <p:spPr>
+            <a:xfrm>
+              <a:off x="4644737" y="1608957"/>
+              <a:ext cx="683581" cy="683581"/>
+            </a:xfrm>
+            <a:prstGeom prst="ellipse">
+              <a:avLst/>
+            </a:prstGeom>
+            <a:solidFill>
+              <a:schemeClr val="bg1"/>
+            </a:solidFill>
+            <a:ln w="38100">
+              <a:solidFill>
+                <a:srgbClr val="FFC000"/>
+              </a:solidFill>
+            </a:ln>
+          </p:spPr>
+          <p:style>
+            <a:lnRef idx="2">
+              <a:schemeClr val="accent1">
+                <a:shade val="50000"/>
+              </a:schemeClr>
+            </a:lnRef>
+            <a:fillRef idx="1">
+              <a:schemeClr val="accent1"/>
+            </a:fillRef>
+            <a:effectRef idx="0">
+              <a:schemeClr val="accent1"/>
+            </a:effectRef>
+            <a:fontRef idx="minor">
+              <a:schemeClr val="lt1"/>
+            </a:fontRef>
+          </p:style>
+          <p:txBody>
+            <a:bodyPr rtlCol="0" anchor="ctr"/>
+            <a:lstStyle/>
+            <a:p>
+              <a:pPr algn="ctr"/>
+              <a:endParaRPr lang="ko-KR" altLang="en-US"/>
+            </a:p>
+          </p:txBody>
+        </p:sp>
+        <p:pic>
+          <p:nvPicPr>
+            <p:cNvPr id="11" name="Picture 2" descr="Bead Sprite - Tamagotchi Full Set by ~satoshi-miyako on deviantART ...">
+              <a:extLst>
+                <a:ext uri="{FF2B5EF4-FFF2-40B4-BE49-F238E27FC236}">
+                  <a16:creationId xmlns:a16="http://schemas.microsoft.com/office/drawing/2014/main" id="{34DEBDEB-664A-4DE5-9C15-5F6563F2EDEC}"/>
+                </a:ext>
+              </a:extLst>
+            </p:cNvPr>
+            <p:cNvPicPr>
+              <a:picLocks noChangeAspect="1" noChangeArrowheads="1"/>
+            </p:cNvPicPr>
+            <p:nvPr/>
+          </p:nvPicPr>
+          <p:blipFill rotWithShape="1">
+            <a:blip r:embed="rId2">
+              <a:extLst>
+                <a:ext uri="{28A0092B-C50C-407E-A947-70E740481C1C}">
+                  <a14:useLocalDpi xmlns:a14="http://schemas.microsoft.com/office/drawing/2010/main" val="0"/>
+                </a:ext>
+              </a:extLst>
+            </a:blip>
+            <a:srcRect l="1220" t="28444" r="81714" b="65689"/>
+            <a:stretch/>
+          </p:blipFill>
+          <p:spPr bwMode="auto">
+            <a:xfrm>
+              <a:off x="4773166" y="1749578"/>
+              <a:ext cx="426721" cy="402337"/>
+            </a:xfrm>
+            <a:prstGeom prst="rect">
+              <a:avLst/>
+            </a:prstGeom>
+            <a:noFill/>
+            <a:extLst>
+              <a:ext uri="{909E8E84-426E-40DD-AFC4-6F175D3DCCD1}">
+                <a14:hiddenFill xmlns:a14="http://schemas.microsoft.com/office/drawing/2010/main">
+                  <a:solidFill>
+                    <a:srgbClr val="FFFFFF"/>
+                  </a:solidFill>
+                </a14:hiddenFill>
+              </a:ext>
+            </a:extLst>
+          </p:spPr>
+        </p:pic>
+      </p:grpSp>
+      <p:grpSp>
+        <p:nvGrpSpPr>
+          <p:cNvPr id="7" name="그룹 6">
+            <a:extLst>
+              <a:ext uri="{FF2B5EF4-FFF2-40B4-BE49-F238E27FC236}">
+                <a16:creationId xmlns:a16="http://schemas.microsoft.com/office/drawing/2014/main" id="{21D33BA0-C072-40C7-BFFB-FD3DA758E6A1}"/>
+              </a:ext>
+            </a:extLst>
+          </p:cNvPr>
+          <p:cNvGrpSpPr/>
+          <p:nvPr/>
+        </p:nvGrpSpPr>
+        <p:grpSpPr>
+          <a:xfrm>
+            <a:off x="5664176" y="1608955"/>
+            <a:ext cx="683581" cy="683581"/>
+            <a:chOff x="6918545" y="2480685"/>
+            <a:chExt cx="683581" cy="683581"/>
+          </a:xfrm>
+        </p:grpSpPr>
+        <p:sp>
+          <p:nvSpPr>
+            <p:cNvPr id="14" name="타원 13">
+              <a:extLst>
+                <a:ext uri="{FF2B5EF4-FFF2-40B4-BE49-F238E27FC236}">
+                  <a16:creationId xmlns:a16="http://schemas.microsoft.com/office/drawing/2014/main" id="{D7F6E391-4DD4-4541-94F4-9F5D4E3A0341}"/>
+                </a:ext>
+              </a:extLst>
+            </p:cNvPr>
+            <p:cNvSpPr/>
+            <p:nvPr/>
+          </p:nvSpPr>
+          <p:spPr>
+            <a:xfrm>
+              <a:off x="6918545" y="2480685"/>
+              <a:ext cx="683581" cy="683581"/>
+            </a:xfrm>
+            <a:prstGeom prst="ellipse">
+              <a:avLst/>
+            </a:prstGeom>
+            <a:solidFill>
+              <a:schemeClr val="bg1"/>
+            </a:solidFill>
+            <a:ln w="38100">
+              <a:solidFill>
+                <a:srgbClr val="FFC000"/>
+              </a:solidFill>
+            </a:ln>
+          </p:spPr>
+          <p:style>
+            <a:lnRef idx="2">
+              <a:schemeClr val="accent1">
+                <a:shade val="50000"/>
+              </a:schemeClr>
+            </a:lnRef>
+            <a:fillRef idx="1">
+              <a:schemeClr val="accent1"/>
+            </a:fillRef>
+            <a:effectRef idx="0">
+              <a:schemeClr val="accent1"/>
+            </a:effectRef>
+            <a:fontRef idx="minor">
+              <a:schemeClr val="lt1"/>
+            </a:fontRef>
+          </p:style>
+          <p:txBody>
+            <a:bodyPr rtlCol="0" anchor="ctr"/>
+            <a:lstStyle/>
+            <a:p>
+              <a:pPr algn="ctr"/>
+              <a:endParaRPr lang="ko-KR" altLang="en-US"/>
+            </a:p>
+          </p:txBody>
+        </p:sp>
+        <p:pic>
+          <p:nvPicPr>
+            <p:cNvPr id="13" name="Picture 2" descr="Bead Sprite - Tamagotchi Full Set by ~satoshi-miyako on deviantART ...">
+              <a:extLst>
+                <a:ext uri="{FF2B5EF4-FFF2-40B4-BE49-F238E27FC236}">
+                  <a16:creationId xmlns:a16="http://schemas.microsoft.com/office/drawing/2014/main" id="{902AC8B9-8E4F-4A0A-AD61-D7D04891944D}"/>
+                </a:ext>
+              </a:extLst>
+            </p:cNvPr>
+            <p:cNvPicPr>
+              <a:picLocks noChangeAspect="1" noChangeArrowheads="1"/>
+            </p:cNvPicPr>
+            <p:nvPr/>
+          </p:nvPicPr>
+          <p:blipFill rotWithShape="1">
+            <a:blip r:embed="rId2">
+              <a:extLst>
+                <a:ext uri="{28A0092B-C50C-407E-A947-70E740481C1C}">
+                  <a14:useLocalDpi xmlns:a14="http://schemas.microsoft.com/office/drawing/2010/main" val="0"/>
+                </a:ext>
+              </a:extLst>
+            </a:blip>
+            <a:srcRect l="80735" t="45880" r="3174" b="47187"/>
+            <a:stretch/>
+          </p:blipFill>
+          <p:spPr bwMode="auto">
+            <a:xfrm>
+              <a:off x="7059167" y="2584731"/>
+              <a:ext cx="402336" cy="475488"/>
+            </a:xfrm>
+            <a:prstGeom prst="rect">
+              <a:avLst/>
+            </a:prstGeom>
+            <a:noFill/>
+            <a:extLst>
+              <a:ext uri="{909E8E84-426E-40DD-AFC4-6F175D3DCCD1}">
+                <a14:hiddenFill xmlns:a14="http://schemas.microsoft.com/office/drawing/2010/main">
+                  <a:solidFill>
+                    <a:srgbClr val="FFFFFF"/>
+                  </a:solidFill>
+                </a14:hiddenFill>
+              </a:ext>
+            </a:extLst>
+          </p:spPr>
+        </p:pic>
+      </p:grpSp>
+    </p:spTree>
+    <p:extLst>
+      <p:ext uri="{BB962C8B-B14F-4D97-AF65-F5344CB8AC3E}">
+        <p14:creationId xmlns:p14="http://schemas.microsoft.com/office/powerpoint/2010/main" val="2589410020"/>
+      </p:ext>
+    </p:extLst>
+  </p:cSld>
+  <p:clrMapOvr>
+    <a:masterClrMapping/>
+  </p:clrMapOvr>
+</p:sld>
+</file>
+
 <file path=ppt/theme/theme1.xml><?xml version="1.0" encoding="utf-8"?>
 <a:theme xmlns:a="http://schemas.openxmlformats.org/drawingml/2006/main" name="Office 테마">
   <a:themeElements>

</xml_diff>